<commit_message>
added video related stuff
</commit_message>
<xml_diff>
--- a/final presentation/video resources/מצגת סרטון.pptx
+++ b/final presentation/video resources/מצגת סרטון.pptx
@@ -5,26 +5,27 @@
     <p:sldMasterId id="2147483660" r:id="rId1"/>
   </p:sldMasterIdLst>
   <p:notesMasterIdLst>
-    <p:notesMasterId r:id="rId19"/>
+    <p:notesMasterId r:id="rId20"/>
   </p:notesMasterIdLst>
   <p:sldIdLst>
     <p:sldId id="256" r:id="rId2"/>
-    <p:sldId id="257" r:id="rId3"/>
-    <p:sldId id="258" r:id="rId4"/>
-    <p:sldId id="259" r:id="rId5"/>
-    <p:sldId id="260" r:id="rId6"/>
-    <p:sldId id="261" r:id="rId7"/>
-    <p:sldId id="262" r:id="rId8"/>
-    <p:sldId id="263" r:id="rId9"/>
-    <p:sldId id="264" r:id="rId10"/>
-    <p:sldId id="265" r:id="rId11"/>
-    <p:sldId id="267" r:id="rId12"/>
-    <p:sldId id="266" r:id="rId13"/>
+    <p:sldId id="258" r:id="rId3"/>
+    <p:sldId id="259" r:id="rId4"/>
+    <p:sldId id="260" r:id="rId5"/>
+    <p:sldId id="261" r:id="rId6"/>
+    <p:sldId id="262" r:id="rId7"/>
+    <p:sldId id="263" r:id="rId8"/>
+    <p:sldId id="264" r:id="rId9"/>
+    <p:sldId id="265" r:id="rId10"/>
+    <p:sldId id="267" r:id="rId11"/>
+    <p:sldId id="266" r:id="rId12"/>
+    <p:sldId id="276" r:id="rId13"/>
     <p:sldId id="269" r:id="rId14"/>
     <p:sldId id="270" r:id="rId15"/>
     <p:sldId id="271" r:id="rId16"/>
     <p:sldId id="273" r:id="rId17"/>
-    <p:sldId id="275" r:id="rId18"/>
+    <p:sldId id="278" r:id="rId18"/>
+    <p:sldId id="275" r:id="rId19"/>
   </p:sldIdLst>
   <p:sldSz cx="9144000" cy="6858000" type="screen4x3"/>
   <p:notesSz cx="6858000" cy="9144000"/>
@@ -209,7 +210,7 @@
             <a:fld id="{95CFFF79-C44D-4836-B8EA-76D6B46F86F7}" type="datetimeFigureOut">
               <a:rPr lang="he-IL" smtClean="0"/>
               <a:pPr/>
-              <a:t>ט"ז/תמוז/תשע"ה</a:t>
+              <a:t>י"ט/תמוז/תשע"ה</a:t>
             </a:fld>
             <a:endParaRPr lang="he-IL"/>
           </a:p>
@@ -530,29 +531,7 @@
                 <a:ea typeface="+mn-ea"/>
                 <a:cs typeface="+mn-cs"/>
               </a:rPr>
-              <a:t>עבור המחרוזת הניתנת כאן (הדגשת המחרוזת) מעתה נתייחס אליה כמחרוזת ההתייחסות, ועבור המחרוזת הקטנה שכאן (הדגשת המחרוזת), </a:t>
-            </a:r>
-            <a:r>
-              <a:rPr lang="he-IL" sz="1200" kern="1200" dirty="0" smtClean="0">
-                <a:solidFill>
-                  <a:schemeClr val="tx1"/>
-                </a:solidFill>
-                <a:latin typeface="+mn-lt"/>
-                <a:ea typeface="+mn-ea"/>
-                <a:cs typeface="+mn-cs"/>
-              </a:rPr>
-              <a:t>שמעתה </a:t>
-            </a:r>
-            <a:r>
-              <a:rPr lang="he-IL" sz="1200" kern="1200" dirty="0" smtClean="0">
-                <a:solidFill>
-                  <a:schemeClr val="tx1"/>
-                </a:solidFill>
-                <a:latin typeface="+mn-lt"/>
-                <a:ea typeface="+mn-ea"/>
-                <a:cs typeface="+mn-cs"/>
-              </a:rPr>
-              <a:t>נתייחס אליה כמחרוזת הדגימה, נרצה למצוא את כלל ההופעות של מחרוזת הדגימה בתוך מחרוזת ההתייחסות עם חסם על מספר אי ההתאמות בין המחרוזות.</a:t>
+              <a:t>עבור המחרוזת הניתנת כאן (הדגשת המחרוזת) מעתה נתייחס אליה כמחרוזת ההתייחסות, ועבור המחרוזת הקטנה שכאן (הדגשת המחרוזת), שמעתה נתייחס אליה כמחרוזת הדגימה, נרצה למצוא את כלל ההופעות של מחרוזת הדגימה בתוך מחרוזת ההתייחסות עם חסם על מספר אי ההתאמות בין המחרוזות.</a:t>
             </a:r>
             <a:endParaRPr lang="he-IL" dirty="0"/>
           </a:p>
@@ -576,7 +555,7 @@
             <a:fld id="{58BBEE03-906A-4BD7-A7F7-953D64ED2552}" type="slidenum">
               <a:rPr lang="he-IL" smtClean="0"/>
               <a:pPr/>
-              <a:t>3</a:t>
+              <a:t>2</a:t>
             </a:fld>
             <a:endParaRPr lang="he-IL"/>
           </a:p>
@@ -658,7 +637,7 @@
             <a:fld id="{58BBEE03-906A-4BD7-A7F7-953D64ED2552}" type="slidenum">
               <a:rPr lang="he-IL" smtClean="0"/>
               <a:pPr/>
-              <a:t>12</a:t>
+              <a:t>11</a:t>
             </a:fld>
             <a:endParaRPr lang="he-IL"/>
           </a:p>
@@ -1042,29 +1021,7 @@
                 <a:ea typeface="+mn-ea"/>
                 <a:cs typeface="+mn-cs"/>
               </a:rPr>
-              <a:t> חוזרת על עצמה עבור פרמטרים שונים וכלל אין קשר בין ההרצות השונות מלבד בחירת התוצאה המקסימאלית </a:t>
-            </a:r>
-            <a:r>
-              <a:rPr lang="he-IL" sz="1200" kern="1200" dirty="0" smtClean="0">
-                <a:solidFill>
-                  <a:schemeClr val="tx1"/>
-                </a:solidFill>
-                <a:latin typeface="+mn-lt"/>
-                <a:ea typeface="+mn-ea"/>
-                <a:cs typeface="+mn-cs"/>
-              </a:rPr>
-              <a:t>ביניהן </a:t>
-            </a:r>
-            <a:r>
-              <a:rPr lang="he-IL" sz="1200" kern="1200" dirty="0" smtClean="0">
-                <a:solidFill>
-                  <a:schemeClr val="tx1"/>
-                </a:solidFill>
-                <a:latin typeface="+mn-lt"/>
-                <a:ea typeface="+mn-ea"/>
-                <a:cs typeface="+mn-cs"/>
-              </a:rPr>
-              <a:t>ולכן נרצה לבצע מקבול של התהליך על מנת להאיץ את זמן הריצה והמשאבים אותם הוא צורך</a:t>
+              <a:t> חוזרת על עצמה עבור פרמטרים שונים וכלל אין קשר בין ההרצות השונות מלבד בחירת התוצאה המקסימאלית ביניהן ולכן נרצה לבצע מקבול של התהליך על מנת להאיץ את זמן הריצה והמשאבים אותם הוא צורך</a:t>
             </a:r>
             <a:endParaRPr lang="he-IL" dirty="0"/>
           </a:p>
@@ -1089,6 +1046,88 @@
               <a:rPr lang="he-IL" smtClean="0"/>
               <a:pPr/>
               <a:t>16</a:t>
+            </a:fld>
+            <a:endParaRPr lang="he-IL"/>
+          </a:p>
+        </p:txBody>
+      </p:sp>
+    </p:spTree>
+  </p:cSld>
+  <p:clrMapOvr>
+    <a:masterClrMapping/>
+  </p:clrMapOvr>
+</p:notes>
+</file>
+
+<file path=ppt/notesSlides/notesSlide15.xml><?xml version="1.0" encoding="utf-8"?>
+<p:notes xmlns:a="http://schemas.openxmlformats.org/drawingml/2006/main" xmlns:r="http://schemas.openxmlformats.org/officeDocument/2006/relationships" xmlns:p="http://schemas.openxmlformats.org/presentationml/2006/main">
+  <p:cSld>
+    <p:spTree>
+      <p:nvGrpSpPr>
+        <p:cNvPr id="1" name=""/>
+        <p:cNvGrpSpPr/>
+        <p:nvPr/>
+      </p:nvGrpSpPr>
+      <p:grpSpPr>
+        <a:xfrm>
+          <a:off x="0" y="0"/>
+          <a:ext cx="0" cy="0"/>
+          <a:chOff x="0" y="0"/>
+          <a:chExt cx="0" cy="0"/>
+        </a:xfrm>
+      </p:grpSpPr>
+      <p:sp>
+        <p:nvSpPr>
+          <p:cNvPr id="2" name="מציין מיקום של תמונת שקופית 1"/>
+          <p:cNvSpPr>
+            <a:spLocks noGrp="1" noRot="1" noChangeAspect="1"/>
+          </p:cNvSpPr>
+          <p:nvPr>
+            <p:ph type="sldImg"/>
+          </p:nvPr>
+        </p:nvSpPr>
+        <p:spPr/>
+      </p:sp>
+      <p:sp>
+        <p:nvSpPr>
+          <p:cNvPr id="3" name="מציין מיקום של הערות 2"/>
+          <p:cNvSpPr>
+            <a:spLocks noGrp="1"/>
+          </p:cNvSpPr>
+          <p:nvPr>
+            <p:ph type="body" idx="1"/>
+          </p:nvPr>
+        </p:nvSpPr>
+        <p:spPr/>
+        <p:txBody>
+          <a:bodyPr>
+            <a:normAutofit/>
+          </a:bodyPr>
+          <a:lstStyle/>
+          <a:p>
+            <a:endParaRPr lang="he-IL" dirty="0"/>
+          </a:p>
+        </p:txBody>
+      </p:sp>
+      <p:sp>
+        <p:nvSpPr>
+          <p:cNvPr id="4" name="מציין מיקום של מספר שקופית 3"/>
+          <p:cNvSpPr>
+            <a:spLocks noGrp="1"/>
+          </p:cNvSpPr>
+          <p:nvPr>
+            <p:ph type="sldNum" sz="quarter" idx="10"/>
+          </p:nvPr>
+        </p:nvSpPr>
+        <p:spPr/>
+        <p:txBody>
+          <a:bodyPr/>
+          <a:lstStyle/>
+          <a:p>
+            <a:fld id="{58BBEE03-906A-4BD7-A7F7-953D64ED2552}" type="slidenum">
+              <a:rPr lang="he-IL" smtClean="0"/>
+              <a:pPr/>
+              <a:t>17</a:t>
             </a:fld>
             <a:endParaRPr lang="he-IL"/>
           </a:p>
@@ -1170,7 +1209,7 @@
             <a:fld id="{58BBEE03-906A-4BD7-A7F7-953D64ED2552}" type="slidenum">
               <a:rPr lang="he-IL" smtClean="0"/>
               <a:pPr/>
-              <a:t>4</a:t>
+              <a:t>3</a:t>
             </a:fld>
             <a:endParaRPr lang="he-IL"/>
           </a:p>
@@ -1252,7 +1291,7 @@
             <a:fld id="{58BBEE03-906A-4BD7-A7F7-953D64ED2552}" type="slidenum">
               <a:rPr lang="he-IL" smtClean="0"/>
               <a:pPr/>
-              <a:t>5</a:t>
+              <a:t>4</a:t>
             </a:fld>
             <a:endParaRPr lang="he-IL"/>
           </a:p>
@@ -1321,29 +1360,7 @@
                 <a:ea typeface="+mn-ea"/>
                 <a:cs typeface="+mn-cs"/>
               </a:rPr>
-              <a:t>קיים </a:t>
-            </a:r>
-            <a:r>
-              <a:rPr lang="he-IL" sz="1200" kern="1200" dirty="0" smtClean="0">
-                <a:solidFill>
-                  <a:schemeClr val="tx1"/>
-                </a:solidFill>
-                <a:latin typeface="+mn-lt"/>
-                <a:ea typeface="+mn-ea"/>
-                <a:cs typeface="+mn-cs"/>
-              </a:rPr>
-              <a:t>אלגוריתם המוצא </a:t>
-            </a:r>
-            <a:r>
-              <a:rPr lang="he-IL" sz="1200" kern="1200" dirty="0" smtClean="0">
-                <a:solidFill>
-                  <a:schemeClr val="tx1"/>
-                </a:solidFill>
-                <a:latin typeface="+mn-lt"/>
-                <a:ea typeface="+mn-ea"/>
-                <a:cs typeface="+mn-cs"/>
-              </a:rPr>
-              <a:t>לנו את כלל ההופעות של מחרוזת הדגימה במחרוזת ההתייחסות ושמו </a:t>
+              <a:t>קיים אלגוריתם המוצא לנו את כלל ההופעות של מחרוזת הדגימה במחרוזת ההתייחסות ושמו </a:t>
             </a:r>
             <a:r>
               <a:rPr lang="en-US" sz="1200" kern="1200" dirty="0" smtClean="0">
@@ -1365,18 +1382,7 @@
                 <a:ea typeface="+mn-ea"/>
                 <a:cs typeface="+mn-cs"/>
               </a:rPr>
-              <a:t>. </a:t>
-            </a:r>
-            <a:r>
-              <a:rPr lang="he-IL" sz="1200" kern="1200" dirty="0" smtClean="0">
-                <a:solidFill>
-                  <a:schemeClr val="tx1"/>
-                </a:solidFill>
-                <a:latin typeface="+mn-lt"/>
-                <a:ea typeface="+mn-ea"/>
-                <a:cs typeface="+mn-cs"/>
-              </a:rPr>
-              <a:t>בין היתר מימשנו גם אותו.</a:t>
+              <a:t>. בין היתר מימשנו גם אותו.</a:t>
             </a:r>
             <a:endParaRPr lang="he-IL" dirty="0"/>
           </a:p>
@@ -1400,7 +1406,7 @@
             <a:fld id="{58BBEE03-906A-4BD7-A7F7-953D64ED2552}" type="slidenum">
               <a:rPr lang="he-IL" smtClean="0"/>
               <a:pPr/>
-              <a:t>6</a:t>
+              <a:t>5</a:t>
             </a:fld>
             <a:endParaRPr lang="he-IL"/>
           </a:p>
@@ -1469,18 +1475,7 @@
                 <a:ea typeface="+mn-ea"/>
                 <a:cs typeface="+mn-cs"/>
               </a:rPr>
-              <a:t>ועתה הגענו לבעיה: מבין כל ההתאמות שנמצאו מי היא ההתאמה הכי </a:t>
-            </a:r>
-            <a:r>
-              <a:rPr lang="he-IL" sz="1200" kern="1200" dirty="0" smtClean="0">
-                <a:solidFill>
-                  <a:schemeClr val="tx1"/>
-                </a:solidFill>
-                <a:latin typeface="+mn-lt"/>
-                <a:ea typeface="+mn-ea"/>
-                <a:cs typeface="+mn-cs"/>
-              </a:rPr>
-              <a:t>טובה?"</a:t>
+              <a:t>ועתה הגענו לבעיה: מבין כל ההתאמות שנמצאו מי היא ההתאמה הכי טובה?"</a:t>
             </a:r>
             <a:endParaRPr lang="he-IL" dirty="0"/>
           </a:p>
@@ -1504,7 +1499,7 @@
             <a:fld id="{58BBEE03-906A-4BD7-A7F7-953D64ED2552}" type="slidenum">
               <a:rPr lang="he-IL" smtClean="0"/>
               <a:pPr/>
-              <a:t>7</a:t>
+              <a:t>6</a:t>
             </a:fld>
             <a:endParaRPr lang="he-IL"/>
           </a:p>
@@ -1595,29 +1590,7 @@
                 <a:ea typeface="+mn-ea"/>
                 <a:cs typeface="+mn-cs"/>
               </a:rPr>
-              <a:t> </a:t>
-            </a:r>
-            <a:r>
-              <a:rPr lang="he-IL" sz="1200" kern="1200" dirty="0" smtClean="0">
-                <a:solidFill>
-                  <a:schemeClr val="tx1"/>
-                </a:solidFill>
-                <a:latin typeface="+mn-lt"/>
-                <a:ea typeface="+mn-ea"/>
-                <a:cs typeface="+mn-cs"/>
-              </a:rPr>
-              <a:t>מספק ציון להתאמה </a:t>
-            </a:r>
-            <a:r>
-              <a:rPr lang="he-IL" sz="1200" kern="1200" dirty="0" smtClean="0">
-                <a:solidFill>
-                  <a:schemeClr val="tx1"/>
-                </a:solidFill>
-                <a:latin typeface="+mn-lt"/>
-                <a:ea typeface="+mn-ea"/>
-                <a:cs typeface="+mn-cs"/>
-              </a:rPr>
-              <a:t>תוך מתן נקודות להתאמה (הדגשת כל ההתאמות) לאי התאמה (הדגשת אי ההתאמות) וכן הוספה ומחיקה (הדגשת המרווחים)</a:t>
+              <a:t> מספק ציון להתאמה תוך מתן נקודות להתאמה (הדגשת כל ההתאמות) לאי התאמה (הדגשת אי ההתאמות) וכן הוספה ומחיקה (הדגשת המרווחים)</a:t>
             </a:r>
             <a:endParaRPr lang="he-IL" dirty="0"/>
           </a:p>
@@ -1641,7 +1614,7 @@
             <a:fld id="{58BBEE03-906A-4BD7-A7F7-953D64ED2552}" type="slidenum">
               <a:rPr lang="he-IL" smtClean="0"/>
               <a:pPr/>
-              <a:t>8</a:t>
+              <a:t>7</a:t>
             </a:fld>
             <a:endParaRPr lang="he-IL"/>
           </a:p>
@@ -1723,7 +1696,7 @@
             <a:fld id="{58BBEE03-906A-4BD7-A7F7-953D64ED2552}" type="slidenum">
               <a:rPr lang="he-IL" smtClean="0"/>
               <a:pPr/>
-              <a:t>9</a:t>
+              <a:t>8</a:t>
             </a:fld>
             <a:endParaRPr lang="he-IL"/>
           </a:p>
@@ -1805,7 +1778,7 @@
             <a:fld id="{58BBEE03-906A-4BD7-A7F7-953D64ED2552}" type="slidenum">
               <a:rPr lang="he-IL" smtClean="0"/>
               <a:pPr/>
-              <a:t>10</a:t>
+              <a:t>9</a:t>
             </a:fld>
             <a:endParaRPr lang="he-IL"/>
           </a:p>
@@ -1887,7 +1860,7 @@
             <a:fld id="{58BBEE03-906A-4BD7-A7F7-953D64ED2552}" type="slidenum">
               <a:rPr lang="he-IL" smtClean="0"/>
               <a:pPr/>
-              <a:t>11</a:t>
+              <a:t>10</a:t>
             </a:fld>
             <a:endParaRPr lang="he-IL"/>
           </a:p>
@@ -2039,7 +2012,7 @@
             <a:fld id="{4E7438E1-117D-44FB-AC24-B79D899BA877}" type="datetimeFigureOut">
               <a:rPr lang="he-IL" smtClean="0"/>
               <a:pPr/>
-              <a:t>ט"ז/תמוז/תשע"ה</a:t>
+              <a:t>י"ט/תמוז/תשע"ה</a:t>
             </a:fld>
             <a:endParaRPr lang="he-IL"/>
           </a:p>
@@ -2910,7 +2883,7 @@
             <a:fld id="{4E7438E1-117D-44FB-AC24-B79D899BA877}" type="datetimeFigureOut">
               <a:rPr lang="he-IL" smtClean="0"/>
               <a:pPr/>
-              <a:t>ט"ז/תמוז/תשע"ה</a:t>
+              <a:t>י"ט/תמוז/תשע"ה</a:t>
             </a:fld>
             <a:endParaRPr lang="he-IL"/>
           </a:p>
@@ -3087,7 +3060,7 @@
             <a:fld id="{4E7438E1-117D-44FB-AC24-B79D899BA877}" type="datetimeFigureOut">
               <a:rPr lang="he-IL" smtClean="0"/>
               <a:pPr/>
-              <a:t>ט"ז/תמוז/תשע"ה</a:t>
+              <a:t>י"ט/תמוז/תשע"ה</a:t>
             </a:fld>
             <a:endParaRPr lang="he-IL"/>
           </a:p>
@@ -3259,7 +3232,7 @@
             <a:fld id="{4E7438E1-117D-44FB-AC24-B79D899BA877}" type="datetimeFigureOut">
               <a:rPr lang="he-IL" smtClean="0"/>
               <a:pPr/>
-              <a:t>ט"ז/תמוז/תשע"ה</a:t>
+              <a:t>י"ט/תמוז/תשע"ה</a:t>
             </a:fld>
             <a:endParaRPr lang="he-IL"/>
           </a:p>
@@ -3471,7 +3444,7 @@
             <a:fld id="{4E7438E1-117D-44FB-AC24-B79D899BA877}" type="datetimeFigureOut">
               <a:rPr lang="he-IL" smtClean="0"/>
               <a:pPr/>
-              <a:t>ט"ז/תמוז/תשע"ה</a:t>
+              <a:t>י"ט/תמוז/תשע"ה</a:t>
             </a:fld>
             <a:endParaRPr lang="he-IL"/>
           </a:p>
@@ -4287,7 +4260,7 @@
             <a:fld id="{4E7438E1-117D-44FB-AC24-B79D899BA877}" type="datetimeFigureOut">
               <a:rPr lang="he-IL" smtClean="0"/>
               <a:pPr/>
-              <a:t>ט"ז/תמוז/תשע"ה</a:t>
+              <a:t>י"ט/תמוז/תשע"ה</a:t>
             </a:fld>
             <a:endParaRPr lang="he-IL"/>
           </a:p>
@@ -4525,7 +4498,7 @@
             <a:fld id="{4E7438E1-117D-44FB-AC24-B79D899BA877}" type="datetimeFigureOut">
               <a:rPr lang="he-IL" smtClean="0"/>
               <a:pPr/>
-              <a:t>ט"ז/תמוז/תשע"ה</a:t>
+              <a:t>י"ט/תמוז/תשע"ה</a:t>
             </a:fld>
             <a:endParaRPr lang="he-IL"/>
           </a:p>
@@ -4850,7 +4823,7 @@
             <a:fld id="{4E7438E1-117D-44FB-AC24-B79D899BA877}" type="datetimeFigureOut">
               <a:rPr lang="he-IL" smtClean="0"/>
               <a:pPr/>
-              <a:t>ט"ז/תמוז/תשע"ה</a:t>
+              <a:t>י"ט/תמוז/תשע"ה</a:t>
             </a:fld>
             <a:endParaRPr lang="he-IL"/>
           </a:p>
@@ -4942,7 +4915,7 @@
             <a:fld id="{4E7438E1-117D-44FB-AC24-B79D899BA877}" type="datetimeFigureOut">
               <a:rPr lang="he-IL" smtClean="0"/>
               <a:pPr/>
-              <a:t>ט"ז/תמוז/תשע"ה</a:t>
+              <a:t>י"ט/תמוז/תשע"ה</a:t>
             </a:fld>
             <a:endParaRPr lang="he-IL"/>
           </a:p>
@@ -5461,7 +5434,7 @@
             <a:fld id="{4E7438E1-117D-44FB-AC24-B79D899BA877}" type="datetimeFigureOut">
               <a:rPr lang="he-IL" smtClean="0"/>
               <a:pPr/>
-              <a:t>ט"ז/תמוז/תשע"ה</a:t>
+              <a:t>י"ט/תמוז/תשע"ה</a:t>
             </a:fld>
             <a:endParaRPr lang="he-IL"/>
           </a:p>
@@ -5974,7 +5947,7 @@
             <a:fld id="{4E7438E1-117D-44FB-AC24-B79D899BA877}" type="datetimeFigureOut">
               <a:rPr lang="he-IL" smtClean="0"/>
               <a:pPr/>
-              <a:t>ט"ז/תמוז/תשע"ה</a:t>
+              <a:t>י"ט/תמוז/תשע"ה</a:t>
             </a:fld>
             <a:endParaRPr lang="he-IL"/>
           </a:p>
@@ -6221,7 +6194,7 @@
             <a:fld id="{4E7438E1-117D-44FB-AC24-B79D899BA877}" type="datetimeFigureOut">
               <a:rPr lang="he-IL" smtClean="0"/>
               <a:pPr/>
-              <a:t>ט"ז/תמוז/תשע"ה</a:t>
+              <a:t>י"ט/תמוז/תשע"ה</a:t>
             </a:fld>
             <a:endParaRPr lang="he-IL"/>
           </a:p>
@@ -6837,7 +6810,12 @@
             <p:ph type="ctrTitle"/>
           </p:nvPr>
         </p:nvSpPr>
-        <p:spPr/>
+        <p:spPr>
+          <a:xfrm>
+            <a:off x="2267744" y="2852936"/>
+            <a:ext cx="6172200" cy="1894362"/>
+          </a:xfrm>
+        </p:spPr>
         <p:txBody>
           <a:bodyPr/>
           <a:lstStyle/>
@@ -6845,13 +6823,13 @@
             <a:pPr algn="r"/>
             <a:r>
               <a:rPr lang="he-IL" dirty="0" smtClean="0"/>
-              <a:t>פרויקט מקבול אלגוריתם </a:t>
+              <a:t>שיפור ומקבול מציאת התאמה אופטימאלית ב-</a:t>
             </a:r>
             <a:r>
               <a:rPr lang="en-US" dirty="0" smtClean="0"/>
-              <a:t>SW</a:t>
-            </a:r>
-            <a:endParaRPr lang="he-IL" dirty="0"/>
+              <a:t>DNA</a:t>
+            </a:r>
+            <a:endParaRPr lang="en-US" dirty="0"/>
           </a:p>
         </p:txBody>
       </p:sp>
@@ -6873,13 +6851,27 @@
             <a:pPr algn="r"/>
             <a:r>
               <a:rPr lang="he-IL" dirty="0" smtClean="0"/>
-              <a:t>הראל עוז </a:t>
+              <a:t>מגיש: </a:t>
             </a:r>
             <a:r>
               <a:rPr lang="he-IL" dirty="0" err="1" smtClean="0"/>
               <a:t>ידגר</a:t>
             </a:r>
+            <a:r>
+              <a:rPr lang="he-IL" dirty="0" smtClean="0"/>
+              <a:t> הראל עוז</a:t>
+            </a:r>
+          </a:p>
+          <a:p>
+            <a:pPr algn="r"/>
             <a:endParaRPr lang="he-IL" dirty="0" smtClean="0"/>
+          </a:p>
+          <a:p>
+            <a:pPr algn="r"/>
+            <a:r>
+              <a:rPr lang="he-IL" dirty="0" smtClean="0"/>
+              <a:t>מנחה: דר' חסין יהודה</a:t>
+            </a:r>
           </a:p>
         </p:txBody>
       </p:sp>
@@ -6888,6 +6880,14 @@
   <p:clrMapOvr>
     <a:masterClrMapping/>
   </p:clrMapOvr>
+  <p:transition/>
+  <p:timing>
+    <p:tnLst>
+      <p:par>
+        <p:cTn id="1" dur="indefinite" restart="never" nodeType="tmRoot"/>
+      </p:par>
+    </p:tnLst>
+  </p:timing>
 </p:sld>
 </file>
 
@@ -6954,117 +6954,6 @@
           <a:p>
             <a:r>
               <a:rPr lang="he-IL" dirty="0" smtClean="0"/>
-              <a:t>אי התאמה</a:t>
-            </a:r>
-          </a:p>
-          <a:p>
-            <a:endParaRPr lang="he-IL" dirty="0" smtClean="0"/>
-          </a:p>
-        </p:txBody>
-      </p:sp>
-      <p:pic>
-        <p:nvPicPr>
-          <p:cNvPr id="5122" name="Picture 2"/>
-          <p:cNvPicPr>
-            <a:picLocks noChangeAspect="1" noChangeArrowheads="1"/>
-          </p:cNvPicPr>
-          <p:nvPr/>
-        </p:nvPicPr>
-        <p:blipFill>
-          <a:blip r:embed="rId3" cstate="print"/>
-          <a:srcRect/>
-          <a:stretch>
-            <a:fillRect/>
-          </a:stretch>
-        </p:blipFill>
-        <p:spPr bwMode="auto">
-          <a:xfrm>
-            <a:off x="769978" y="3000374"/>
-            <a:ext cx="7241980" cy="1508746"/>
-          </a:xfrm>
-          <a:prstGeom prst="rect">
-            <a:avLst/>
-          </a:prstGeom>
-          <a:noFill/>
-          <a:ln w="9525">
-            <a:noFill/>
-            <a:miter lim="800000"/>
-            <a:headEnd/>
-            <a:tailEnd/>
-          </a:ln>
-        </p:spPr>
-      </p:pic>
-    </p:spTree>
-  </p:cSld>
-  <p:clrMapOvr>
-    <a:masterClrMapping/>
-  </p:clrMapOvr>
-</p:sld>
-</file>
-
-<file path=ppt/slides/slide11.xml><?xml version="1.0" encoding="utf-8"?>
-<p:sld xmlns:a="http://schemas.openxmlformats.org/drawingml/2006/main" xmlns:r="http://schemas.openxmlformats.org/officeDocument/2006/relationships" xmlns:p="http://schemas.openxmlformats.org/presentationml/2006/main">
-  <p:cSld>
-    <p:spTree>
-      <p:nvGrpSpPr>
-        <p:cNvPr id="1" name=""/>
-        <p:cNvGrpSpPr/>
-        <p:nvPr/>
-      </p:nvGrpSpPr>
-      <p:grpSpPr>
-        <a:xfrm>
-          <a:off x="0" y="0"/>
-          <a:ext cx="0" cy="0"/>
-          <a:chOff x="0" y="0"/>
-          <a:chExt cx="0" cy="0"/>
-        </a:xfrm>
-      </p:grpSpPr>
-      <p:sp>
-        <p:nvSpPr>
-          <p:cNvPr id="2" name="כותרת 1"/>
-          <p:cNvSpPr>
-            <a:spLocks noGrp="1"/>
-          </p:cNvSpPr>
-          <p:nvPr>
-            <p:ph type="title"/>
-          </p:nvPr>
-        </p:nvSpPr>
-        <p:spPr/>
-        <p:txBody>
-          <a:bodyPr>
-            <a:noAutofit/>
-          </a:bodyPr>
-          <a:lstStyle/>
-          <a:p>
-            <a:pPr algn="l" rtl="0"/>
-            <a:r>
-              <a:rPr lang="en-US" sz="4400" dirty="0" smtClean="0"/>
-              <a:t>Smith Waterman</a:t>
-            </a:r>
-            <a:endParaRPr lang="he-IL" sz="4400" dirty="0"/>
-          </a:p>
-        </p:txBody>
-      </p:sp>
-      <p:sp>
-        <p:nvSpPr>
-          <p:cNvPr id="3" name="מציין מיקום תוכן 2"/>
-          <p:cNvSpPr>
-            <a:spLocks noGrp="1"/>
-          </p:cNvSpPr>
-          <p:nvPr>
-            <p:ph sz="quarter" idx="1"/>
-          </p:nvPr>
-        </p:nvSpPr>
-        <p:spPr/>
-        <p:txBody>
-          <a:bodyPr/>
-          <a:lstStyle/>
-          <a:p>
-            <a:endParaRPr lang="he-IL" dirty="0" smtClean="0"/>
-          </a:p>
-          <a:p>
-            <a:r>
-              <a:rPr lang="he-IL" dirty="0" smtClean="0"/>
               <a:t>הוספה</a:t>
             </a:r>
           </a:p>
@@ -7110,10 +6999,17 @@
   <p:clrMapOvr>
     <a:masterClrMapping/>
   </p:clrMapOvr>
+  <p:timing>
+    <p:tnLst>
+      <p:par>
+        <p:cTn id="1" dur="indefinite" restart="never" nodeType="tmRoot"/>
+      </p:par>
+    </p:tnLst>
+  </p:timing>
 </p:sld>
 </file>
 
-<file path=ppt/slides/slide12.xml><?xml version="1.0" encoding="utf-8"?>
+<file path=ppt/slides/slide11.xml><?xml version="1.0" encoding="utf-8"?>
 <p:sld xmlns:a="http://schemas.openxmlformats.org/drawingml/2006/main" xmlns:r="http://schemas.openxmlformats.org/officeDocument/2006/relationships" xmlns:p="http://schemas.openxmlformats.org/presentationml/2006/main">
   <p:cSld>
     <p:spTree>
@@ -7221,6 +7117,186 @@
   <p:clrMapOvr>
     <a:masterClrMapping/>
   </p:clrMapOvr>
+  <p:timing>
+    <p:tnLst>
+      <p:par>
+        <p:cTn id="1" dur="indefinite" restart="never" nodeType="tmRoot"/>
+      </p:par>
+    </p:tnLst>
+  </p:timing>
+</p:sld>
+</file>
+
+<file path=ppt/slides/slide12.xml><?xml version="1.0" encoding="utf-8"?>
+<p:sld xmlns:a="http://schemas.openxmlformats.org/drawingml/2006/main" xmlns:r="http://schemas.openxmlformats.org/officeDocument/2006/relationships" xmlns:p="http://schemas.openxmlformats.org/presentationml/2006/main">
+  <p:cSld>
+    <p:spTree>
+      <p:nvGrpSpPr>
+        <p:cNvPr id="1" name=""/>
+        <p:cNvGrpSpPr/>
+        <p:nvPr/>
+      </p:nvGrpSpPr>
+      <p:grpSpPr>
+        <a:xfrm>
+          <a:off x="0" y="0"/>
+          <a:ext cx="0" cy="0"/>
+          <a:chOff x="0" y="0"/>
+          <a:chExt cx="0" cy="0"/>
+        </a:xfrm>
+      </p:grpSpPr>
+      <p:sp>
+        <p:nvSpPr>
+          <p:cNvPr id="2" name="כותרת 1"/>
+          <p:cNvSpPr>
+            <a:spLocks noGrp="1"/>
+          </p:cNvSpPr>
+          <p:nvPr>
+            <p:ph type="title"/>
+          </p:nvPr>
+        </p:nvSpPr>
+        <p:spPr/>
+        <p:txBody>
+          <a:bodyPr>
+            <a:normAutofit/>
+          </a:bodyPr>
+          <a:lstStyle/>
+          <a:p>
+            <a:pPr rtl="0"/>
+            <a:r>
+              <a:rPr lang="en-US" sz="4400" dirty="0" smtClean="0"/>
+              <a:t>Smith Waterman</a:t>
+            </a:r>
+            <a:endParaRPr lang="he-IL" sz="4400" dirty="0"/>
+          </a:p>
+        </p:txBody>
+      </p:sp>
+      <p:sp>
+        <p:nvSpPr>
+          <p:cNvPr id="3" name="מציין מיקום תוכן 2"/>
+          <p:cNvSpPr>
+            <a:spLocks noGrp="1"/>
+          </p:cNvSpPr>
+          <p:nvPr>
+            <p:ph sz="quarter" idx="1"/>
+          </p:nvPr>
+        </p:nvSpPr>
+        <p:spPr/>
+        <p:txBody>
+          <a:bodyPr/>
+          <a:lstStyle/>
+          <a:p>
+            <a:r>
+              <a:rPr lang="he-IL" dirty="0" smtClean="0"/>
+              <a:t>החישוב:</a:t>
+            </a:r>
+          </a:p>
+          <a:p>
+            <a:pPr algn="r">
+              <a:buNone/>
+            </a:pPr>
+            <a:r>
+              <a:rPr lang="he-IL" dirty="0" smtClean="0"/>
+              <a:t>	עבור </a:t>
+            </a:r>
+            <a:r>
+              <a:rPr lang="en-US" dirty="0" smtClean="0"/>
+              <a:t>a=“AGCTT”</a:t>
+            </a:r>
+            <a:r>
+              <a:rPr lang="he-IL" dirty="0" smtClean="0"/>
+              <a:t> ו-</a:t>
+            </a:r>
+            <a:r>
+              <a:rPr lang="en-US" dirty="0" smtClean="0"/>
+              <a:t>b=“AGTCTT”</a:t>
+            </a:r>
+            <a:r>
+              <a:rPr lang="he-IL" dirty="0" smtClean="0"/>
+              <a:t> ו-</a:t>
+            </a:r>
+          </a:p>
+          <a:p>
+            <a:pPr algn="l" rtl="0">
+              <a:buNone/>
+            </a:pPr>
+            <a:r>
+              <a:rPr lang="he-IL" dirty="0" smtClean="0"/>
+              <a:t> </a:t>
+            </a:r>
+            <a:endParaRPr lang="he-IL" dirty="0"/>
+          </a:p>
+        </p:txBody>
+      </p:sp>
+      <p:pic>
+        <p:nvPicPr>
+          <p:cNvPr id="2051" name="Picture 3"/>
+          <p:cNvPicPr>
+            <a:picLocks noChangeAspect="1" noChangeArrowheads="1"/>
+          </p:cNvPicPr>
+          <p:nvPr/>
+        </p:nvPicPr>
+        <p:blipFill>
+          <a:blip r:embed="rId2" cstate="print"/>
+          <a:srcRect/>
+          <a:stretch>
+            <a:fillRect/>
+          </a:stretch>
+        </p:blipFill>
+        <p:spPr bwMode="auto">
+          <a:xfrm>
+            <a:off x="323528" y="1916832"/>
+            <a:ext cx="2744305" cy="1335067"/>
+          </a:xfrm>
+          <a:prstGeom prst="rect">
+            <a:avLst/>
+          </a:prstGeom>
+          <a:noFill/>
+          <a:ln w="9525">
+            <a:noFill/>
+            <a:miter lim="800000"/>
+            <a:headEnd/>
+            <a:tailEnd/>
+          </a:ln>
+        </p:spPr>
+      </p:pic>
+      <p:pic>
+        <p:nvPicPr>
+          <p:cNvPr id="2052" name="Picture 4" descr="C:\Users\Oz\Documents\GitHub\BWA-Parallel\final presentation\video resources\example1\SW RUNNING.png"/>
+          <p:cNvPicPr>
+            <a:picLocks noChangeAspect="1" noChangeArrowheads="1"/>
+          </p:cNvPicPr>
+          <p:nvPr/>
+        </p:nvPicPr>
+        <p:blipFill>
+          <a:blip r:embed="rId3" cstate="print"/>
+          <a:srcRect/>
+          <a:stretch>
+            <a:fillRect/>
+          </a:stretch>
+        </p:blipFill>
+        <p:spPr bwMode="auto">
+          <a:xfrm>
+            <a:off x="2843808" y="2924944"/>
+            <a:ext cx="4927009" cy="3462222"/>
+          </a:xfrm>
+          <a:prstGeom prst="rect">
+            <a:avLst/>
+          </a:prstGeom>
+          <a:noFill/>
+        </p:spPr>
+      </p:pic>
+    </p:spTree>
+  </p:cSld>
+  <p:clrMapOvr>
+    <a:masterClrMapping/>
+  </p:clrMapOvr>
+  <p:timing>
+    <p:tnLst>
+      <p:par>
+        <p:cTn id="1" dur="indefinite" restart="never" nodeType="tmRoot"/>
+      </p:par>
+    </p:tnLst>
+  </p:timing>
 </p:sld>
 </file>
 
@@ -7334,6 +7410,13 @@
   <p:clrMapOvr>
     <a:masterClrMapping/>
   </p:clrMapOvr>
+  <p:timing>
+    <p:tnLst>
+      <p:par>
+        <p:cTn id="1" dur="indefinite" restart="never" nodeType="tmRoot"/>
+      </p:par>
+    </p:tnLst>
+  </p:timing>
 </p:sld>
 </file>
 
@@ -7479,6 +7562,13 @@
   <p:clrMapOvr>
     <a:masterClrMapping/>
   </p:clrMapOvr>
+  <p:timing>
+    <p:tnLst>
+      <p:par>
+        <p:cTn id="1" dur="indefinite" restart="never" nodeType="tmRoot"/>
+      </p:par>
+    </p:tnLst>
+  </p:timing>
 </p:sld>
 </file>
 
@@ -7542,26 +7632,43 @@
           <a:p>
             <a:r>
               <a:rPr lang="he-IL" dirty="0" smtClean="0"/>
-              <a:t>מספר רב של מחרוזות דגימה</a:t>
-            </a:r>
-          </a:p>
-          <a:p>
-            <a:endParaRPr lang="he-IL" dirty="0" smtClean="0"/>
+              <a:t>מספר רב של מחרוזות דגימה עם </a:t>
+            </a:r>
           </a:p>
           <a:p>
             <a:pPr>
               <a:buNone/>
             </a:pPr>
             <a:r>
-              <a:rPr lang="he-IL" sz="8800" dirty="0" smtClean="0"/>
-              <a:t>להוסיף סרטון כאן</a:t>
+              <a:rPr lang="he-IL" dirty="0" smtClean="0"/>
+              <a:t>	מספר התאמות מכיוון שלכל </a:t>
             </a:r>
           </a:p>
           <a:p>
             <a:pPr>
               <a:buNone/>
             </a:pPr>
-            <a:endParaRPr lang="he-IL" dirty="0" smtClean="0"/>
+            <a:r>
+              <a:rPr lang="he-IL" dirty="0" smtClean="0"/>
+              <a:t>	התאמה נבצע </a:t>
+            </a:r>
+            <a:r>
+              <a:rPr lang="en-US" dirty="0" smtClean="0"/>
+              <a:t>SW</a:t>
+            </a:r>
+            <a:r>
+              <a:rPr lang="he-IL" dirty="0" smtClean="0"/>
+              <a:t>, זמן ריצת </a:t>
+            </a:r>
+          </a:p>
+          <a:p>
+            <a:pPr>
+              <a:buNone/>
+            </a:pPr>
+            <a:r>
+              <a:rPr lang="he-IL" dirty="0" smtClean="0"/>
+              <a:t>	התהליך ארוך.</a:t>
+            </a:r>
           </a:p>
           <a:p>
             <a:endParaRPr lang="he-IL" dirty="0" smtClean="0"/>
@@ -7574,11 +7681,189 @@
           </a:p>
         </p:txBody>
       </p:sp>
+      <p:pic>
+        <p:nvPicPr>
+          <p:cNvPr id="5" name="running.mp4">
+            <a:hlinkClick r:id="" action="ppaction://media"/>
+          </p:cNvPr>
+          <p:cNvPicPr>
+            <a:picLocks noRot="1" noChangeAspect="1"/>
+          </p:cNvPicPr>
+          <p:nvPr>
+            <a:videoFile r:link="rId1"/>
+          </p:nvPr>
+        </p:nvPicPr>
+        <p:blipFill>
+          <a:blip r:embed="rId4" cstate="print"/>
+          <a:stretch>
+            <a:fillRect/>
+          </a:stretch>
+        </p:blipFill>
+        <p:spPr>
+          <a:xfrm>
+            <a:off x="539551" y="1412776"/>
+            <a:ext cx="3552395" cy="4680520"/>
+          </a:xfrm>
+          <a:prstGeom prst="rect">
+            <a:avLst/>
+          </a:prstGeom>
+        </p:spPr>
+      </p:pic>
     </p:spTree>
   </p:cSld>
   <p:clrMapOvr>
     <a:masterClrMapping/>
   </p:clrMapOvr>
+  <p:timing>
+    <p:tnLst>
+      <p:par>
+        <p:cTn id="1" dur="indefinite" restart="never" nodeType="tmRoot">
+          <p:childTnLst>
+            <p:seq concurrent="1" nextAc="seek">
+              <p:cTn id="2" dur="indefinite" nodeType="mainSeq">
+                <p:childTnLst>
+                  <p:par>
+                    <p:cTn id="3" fill="hold">
+                      <p:stCondLst>
+                        <p:cond delay="indefinite"/>
+                        <p:cond evt="onBegin" delay="0">
+                          <p:tn val="2"/>
+                        </p:cond>
+                      </p:stCondLst>
+                      <p:childTnLst>
+                        <p:par>
+                          <p:cTn id="4" fill="hold">
+                            <p:stCondLst>
+                              <p:cond delay="0"/>
+                            </p:stCondLst>
+                            <p:childTnLst>
+                              <p:par>
+                                <p:cTn id="5" presetID="1" presetClass="mediacall" presetSubtype="0" fill="hold" nodeType="afterEffect">
+                                  <p:stCondLst>
+                                    <p:cond delay="0"/>
+                                  </p:stCondLst>
+                                  <p:childTnLst>
+                                    <p:cmd type="call" cmd="playFrom(0.0)">
+                                      <p:cBhvr>
+                                        <p:cTn id="6" dur="1" fill="hold"/>
+                                        <p:tgtEl>
+                                          <p:spTgt spid="5"/>
+                                        </p:tgtEl>
+                                      </p:cBhvr>
+                                    </p:cmd>
+                                  </p:childTnLst>
+                                </p:cTn>
+                              </p:par>
+                            </p:childTnLst>
+                          </p:cTn>
+                        </p:par>
+                      </p:childTnLst>
+                    </p:cTn>
+                  </p:par>
+                </p:childTnLst>
+              </p:cTn>
+              <p:prevCondLst>
+                <p:cond evt="onPrev" delay="0">
+                  <p:tgtEl>
+                    <p:sldTgt/>
+                  </p:tgtEl>
+                </p:cond>
+              </p:prevCondLst>
+              <p:nextCondLst>
+                <p:cond evt="onNext" delay="0">
+                  <p:tgtEl>
+                    <p:sldTgt/>
+                  </p:tgtEl>
+                </p:cond>
+              </p:nextCondLst>
+            </p:seq>
+            <p:video>
+              <p:cMediaNode>
+                <p:cTn id="7" fill="hold" display="0">
+                  <p:stCondLst>
+                    <p:cond delay="indefinite"/>
+                  </p:stCondLst>
+                  <p:endCondLst>
+                    <p:cond evt="onNext" delay="0">
+                      <p:tgtEl>
+                        <p:sldTgt/>
+                      </p:tgtEl>
+                    </p:cond>
+                    <p:cond evt="onPrev" delay="0">
+                      <p:tgtEl>
+                        <p:sldTgt/>
+                      </p:tgtEl>
+                    </p:cond>
+                  </p:endCondLst>
+                </p:cTn>
+                <p:tgtEl>
+                  <p:spTgt spid="5"/>
+                </p:tgtEl>
+              </p:cMediaNode>
+            </p:video>
+            <p:seq concurrent="1" nextAc="seek">
+              <p:cTn id="8" restart="whenNotActive" fill="hold" evtFilter="cancelBubble" nodeType="interactiveSeq">
+                <p:stCondLst>
+                  <p:cond evt="onClick" delay="0">
+                    <p:tgtEl>
+                      <p:spTgt spid="5"/>
+                    </p:tgtEl>
+                  </p:cond>
+                </p:stCondLst>
+                <p:endSync evt="end" delay="0">
+                  <p:rtn val="all"/>
+                </p:endSync>
+                <p:childTnLst>
+                  <p:par>
+                    <p:cTn id="9" fill="hold">
+                      <p:stCondLst>
+                        <p:cond delay="0"/>
+                      </p:stCondLst>
+                      <p:childTnLst>
+                        <p:par>
+                          <p:cTn id="10" fill="hold">
+                            <p:stCondLst>
+                              <p:cond delay="0"/>
+                            </p:stCondLst>
+                            <p:childTnLst>
+                              <p:par>
+                                <p:cTn id="11" presetID="2" presetClass="mediacall" presetSubtype="0" fill="hold" nodeType="clickEffect">
+                                  <p:stCondLst>
+                                    <p:cond delay="0"/>
+                                  </p:stCondLst>
+                                  <p:childTnLst>
+                                    <p:cmd type="call" cmd="togglePause">
+                                      <p:cBhvr>
+                                        <p:cTn id="12" dur="1" fill="hold"/>
+                                        <p:tgtEl>
+                                          <p:spTgt spid="5"/>
+                                        </p:tgtEl>
+                                      </p:cBhvr>
+                                    </p:cmd>
+                                  </p:childTnLst>
+                                </p:cTn>
+                              </p:par>
+                            </p:childTnLst>
+                          </p:cTn>
+                        </p:par>
+                      </p:childTnLst>
+                    </p:cTn>
+                  </p:par>
+                </p:childTnLst>
+              </p:cTn>
+              <p:nextCondLst>
+                <p:cond evt="onClick" delay="0">
+                  <p:tgtEl>
+                    <p:spTgt spid="5"/>
+                  </p:tgtEl>
+                </p:cond>
+              </p:nextCondLst>
+            </p:seq>
+          </p:childTnLst>
+        </p:cTn>
+      </p:par>
+    </p:tnLst>
+  </p:timing>
 </p:sld>
 </file>
 
@@ -7643,30 +7928,48 @@
             <a:endParaRPr lang="he-IL" dirty="0" smtClean="0"/>
           </a:p>
           <a:p>
+            <a:pPr lvl="0"/>
             <a:r>
               <a:rPr lang="he-IL" dirty="0" smtClean="0"/>
-              <a:t>מקבול התהליך ככל היותר על מנת לשפר את:</a:t>
-            </a:r>
+              <a:t>שיפור אלגוריתם </a:t>
+            </a:r>
+            <a:r>
+              <a:rPr lang="en-US" dirty="0" smtClean="0"/>
+              <a:t>SW</a:t>
+            </a:r>
+            <a:r>
+              <a:rPr lang="he-IL" dirty="0" smtClean="0"/>
+              <a:t> ע"י:</a:t>
+            </a:r>
+            <a:endParaRPr lang="en-US" sz="1400" dirty="0" smtClean="0"/>
           </a:p>
           <a:p>
             <a:pPr lvl="1"/>
             <a:r>
+              <a:rPr lang="he-IL" sz="2400" dirty="0" smtClean="0"/>
+              <a:t>שיפור זמן הריצה.</a:t>
+            </a:r>
+            <a:endParaRPr lang="en-US" sz="1400" dirty="0" smtClean="0"/>
+          </a:p>
+          <a:p>
+            <a:pPr lvl="1"/>
+            <a:r>
+              <a:rPr lang="he-IL" sz="2400" dirty="0" smtClean="0"/>
+              <a:t>שיפור צריכת הזיכרון.</a:t>
+            </a:r>
+            <a:endParaRPr lang="en-US" sz="1400" dirty="0" smtClean="0"/>
+          </a:p>
+          <a:p>
+            <a:endParaRPr lang="he-IL" dirty="0" smtClean="0"/>
+          </a:p>
+          <a:p>
+            <a:endParaRPr lang="he-IL" dirty="0" smtClean="0"/>
+          </a:p>
+          <a:p>
+            <a:r>
               <a:rPr lang="he-IL" dirty="0" smtClean="0"/>
-              <a:t>זמן הריצה.</a:t>
-            </a:r>
-          </a:p>
-          <a:p>
-            <a:pPr lvl="1"/>
-            <a:r>
-              <a:rPr lang="he-IL" dirty="0" smtClean="0"/>
-              <a:t>צריכת המשאבים.</a:t>
-            </a:r>
-          </a:p>
-          <a:p>
-            <a:pPr>
-              <a:buNone/>
-            </a:pPr>
-            <a:endParaRPr lang="he-IL" dirty="0" smtClean="0"/>
+              <a:t>מקבול התהליך על מנת לנצל את משאבי המחשב בצורה יעילה.</a:t>
+            </a:r>
           </a:p>
           <a:p>
             <a:endParaRPr lang="he-IL" dirty="0" smtClean="0"/>
@@ -7723,40 +8026,54 @@
         </p:nvSpPr>
         <p:spPr/>
         <p:txBody>
+          <a:bodyPr>
+            <a:normAutofit/>
+          </a:bodyPr>
+          <a:lstStyle/>
+          <a:p>
+            <a:pPr algn="r"/>
+            <a:r>
+              <a:rPr lang="he-IL" sz="6000" dirty="0" smtClean="0"/>
+              <a:t>שיפור אלגוריתם </a:t>
+            </a:r>
+            <a:r>
+              <a:rPr lang="en-US" sz="6000" dirty="0" smtClean="0"/>
+              <a:t>SW</a:t>
+            </a:r>
+            <a:endParaRPr lang="he-IL" sz="6000" dirty="0"/>
+          </a:p>
+        </p:txBody>
+      </p:sp>
+      <p:sp>
+        <p:nvSpPr>
+          <p:cNvPr id="3" name="מציין מיקום תוכן 2"/>
+          <p:cNvSpPr>
+            <a:spLocks noGrp="1"/>
+          </p:cNvSpPr>
+          <p:nvPr>
+            <p:ph sz="quarter" idx="1"/>
+          </p:nvPr>
+        </p:nvSpPr>
+        <p:spPr/>
+        <p:txBody>
           <a:bodyPr/>
           <a:lstStyle/>
           <a:p>
-            <a:pPr algn="r"/>
-            <a:r>
-              <a:rPr lang="he-IL" sz="6000" dirty="0" smtClean="0"/>
-              <a:t>הרצה</a:t>
-            </a:r>
-            <a:endParaRPr lang="he-IL" sz="6000" dirty="0"/>
-          </a:p>
-        </p:txBody>
-      </p:sp>
-      <p:sp>
-        <p:nvSpPr>
-          <p:cNvPr id="3" name="מציין מיקום תוכן 2"/>
-          <p:cNvSpPr>
-            <a:spLocks noGrp="1"/>
-          </p:cNvSpPr>
-          <p:nvPr>
-            <p:ph sz="quarter" idx="2"/>
-          </p:nvPr>
-        </p:nvSpPr>
-        <p:spPr/>
-        <p:txBody>
-          <a:bodyPr/>
-          <a:lstStyle/>
-          <a:p>
-            <a:pPr>
-              <a:buNone/>
-            </a:pPr>
-            <a:r>
-              <a:rPr lang="he-IL" sz="8000" dirty="0" smtClean="0"/>
-              <a:t>להוסיף סרטון</a:t>
-            </a:r>
+            <a:endParaRPr lang="he-IL" dirty="0" smtClean="0"/>
+          </a:p>
+          <a:p>
+            <a:pPr lvl="0"/>
+            <a:r>
+              <a:rPr lang="he-IL" dirty="0" smtClean="0"/>
+              <a:t>תכנון ומימוש מספר גרסאות </a:t>
+            </a:r>
+          </a:p>
+          <a:p>
+            <a:pPr lvl="0"/>
+            <a:endParaRPr lang="he-IL" dirty="0" smtClean="0"/>
+          </a:p>
+          <a:p>
+            <a:endParaRPr lang="he-IL" dirty="0" smtClean="0"/>
           </a:p>
           <a:p>
             <a:pPr>
@@ -7766,36 +8083,91 @@
           </a:p>
         </p:txBody>
       </p:sp>
-      <p:sp>
-        <p:nvSpPr>
-          <p:cNvPr id="4" name="מציין מיקום תוכן 3"/>
-          <p:cNvSpPr>
-            <a:spLocks noGrp="1"/>
-          </p:cNvSpPr>
-          <p:nvPr>
-            <p:ph sz="quarter" idx="4"/>
-          </p:nvPr>
-        </p:nvSpPr>
-        <p:spPr/>
-        <p:txBody>
-          <a:bodyPr>
-            <a:normAutofit/>
-          </a:bodyPr>
-          <a:lstStyle/>
-          <a:p>
-            <a:pPr>
-              <a:buNone/>
-            </a:pPr>
-            <a:r>
-              <a:rPr lang="he-IL" sz="8000" dirty="0" smtClean="0"/>
-              <a:t>להוסיף סרטון</a:t>
-            </a:r>
-          </a:p>
-          <a:p>
-            <a:pPr>
-              <a:buNone/>
-            </a:pPr>
-            <a:endParaRPr lang="he-IL" sz="8000" dirty="0"/>
+      <p:pic>
+        <p:nvPicPr>
+          <p:cNvPr id="4107" name="Picture 11"/>
+          <p:cNvPicPr>
+            <a:picLocks noChangeAspect="1" noChangeArrowheads="1"/>
+          </p:cNvPicPr>
+          <p:nvPr/>
+        </p:nvPicPr>
+        <p:blipFill>
+          <a:blip r:embed="rId3" cstate="print"/>
+          <a:srcRect/>
+          <a:stretch>
+            <a:fillRect/>
+          </a:stretch>
+        </p:blipFill>
+        <p:spPr bwMode="auto">
+          <a:xfrm>
+            <a:off x="899592" y="2636912"/>
+            <a:ext cx="6977977" cy="1764779"/>
+          </a:xfrm>
+          <a:prstGeom prst="rect">
+            <a:avLst/>
+          </a:prstGeom>
+          <a:noFill/>
+          <a:ln w="9525">
+            <a:noFill/>
+            <a:miter lim="800000"/>
+            <a:headEnd/>
+            <a:tailEnd/>
+          </a:ln>
+        </p:spPr>
+      </p:pic>
+    </p:spTree>
+  </p:cSld>
+  <p:clrMapOvr>
+    <a:masterClrMapping/>
+  </p:clrMapOvr>
+  <p:timing>
+    <p:tnLst>
+      <p:par>
+        <p:cTn id="1" dur="indefinite" restart="never" nodeType="tmRoot"/>
+      </p:par>
+    </p:tnLst>
+  </p:timing>
+</p:sld>
+</file>
+
+<file path=ppt/slides/slide18.xml><?xml version="1.0" encoding="utf-8"?>
+<p:sld xmlns:a="http://schemas.openxmlformats.org/drawingml/2006/main" xmlns:r="http://schemas.openxmlformats.org/officeDocument/2006/relationships" xmlns:p="http://schemas.openxmlformats.org/presentationml/2006/main">
+  <p:cSld>
+    <p:spTree>
+      <p:nvGrpSpPr>
+        <p:cNvPr id="1" name=""/>
+        <p:cNvGrpSpPr/>
+        <p:nvPr/>
+      </p:nvGrpSpPr>
+      <p:grpSpPr>
+        <a:xfrm>
+          <a:off x="0" y="0"/>
+          <a:ext cx="0" cy="0"/>
+          <a:chOff x="0" y="0"/>
+          <a:chExt cx="0" cy="0"/>
+        </a:xfrm>
+      </p:grpSpPr>
+      <p:sp>
+        <p:nvSpPr>
+          <p:cNvPr id="2" name="כותרת 1"/>
+          <p:cNvSpPr>
+            <a:spLocks noGrp="1"/>
+          </p:cNvSpPr>
+          <p:nvPr>
+            <p:ph type="title"/>
+          </p:nvPr>
+        </p:nvSpPr>
+        <p:spPr/>
+        <p:txBody>
+          <a:bodyPr/>
+          <a:lstStyle/>
+          <a:p>
+            <a:pPr algn="r"/>
+            <a:r>
+              <a:rPr lang="he-IL" sz="6000" dirty="0" smtClean="0"/>
+              <a:t>מקבול</a:t>
+            </a:r>
+            <a:endParaRPr lang="he-IL" sz="6000" dirty="0"/>
           </a:p>
         </p:txBody>
       </p:sp>
@@ -7834,7 +8206,7 @@
                   <a:schemeClr val="tx1"/>
                 </a:solidFill>
               </a:rPr>
-              <a:t>הרצה במקביל</a:t>
+              <a:t>הרצה במקביל (4 חוטים)</a:t>
             </a:r>
             <a:endParaRPr lang="he-IL" sz="2400" b="0" dirty="0">
               <a:solidFill>
@@ -7889,11 +8261,327 @@
           </a:p>
         </p:txBody>
       </p:sp>
+      <p:pic>
+        <p:nvPicPr>
+          <p:cNvPr id="9" name="sequential.mp4">
+            <a:hlinkClick r:id="" action="ppaction://media"/>
+          </p:cNvPr>
+          <p:cNvPicPr>
+            <a:picLocks noGrp="1" noRot="1" noChangeAspect="1"/>
+          </p:cNvPicPr>
+          <p:nvPr>
+            <p:ph sz="quarter" idx="4"/>
+            <a:videoFile r:link="rId1"/>
+          </p:nvPr>
+        </p:nvPicPr>
+        <p:blipFill>
+          <a:blip r:embed="rId4" cstate="print"/>
+          <a:stretch>
+            <a:fillRect/>
+          </a:stretch>
+        </p:blipFill>
+        <p:spPr>
+          <a:xfrm>
+            <a:off x="4392844" y="2348880"/>
+            <a:ext cx="3552395" cy="3960440"/>
+          </a:xfrm>
+          <a:prstGeom prst="rect">
+            <a:avLst/>
+          </a:prstGeom>
+        </p:spPr>
+      </p:pic>
+      <p:pic>
+        <p:nvPicPr>
+          <p:cNvPr id="12" name="parallel.mp4">
+            <a:hlinkClick r:id="" action="ppaction://media"/>
+          </p:cNvPr>
+          <p:cNvPicPr>
+            <a:picLocks noGrp="1" noRot="1" noChangeAspect="1"/>
+          </p:cNvPicPr>
+          <p:nvPr>
+            <p:ph sz="quarter" idx="2"/>
+            <a:videoFile r:link="rId2"/>
+          </p:nvPr>
+        </p:nvPicPr>
+        <p:blipFill>
+          <a:blip r:embed="rId4" cstate="print"/>
+          <a:stretch>
+            <a:fillRect/>
+          </a:stretch>
+        </p:blipFill>
+        <p:spPr>
+          <a:xfrm>
+            <a:off x="539552" y="2348880"/>
+            <a:ext cx="3586921" cy="3960439"/>
+          </a:xfrm>
+          <a:prstGeom prst="rect">
+            <a:avLst/>
+          </a:prstGeom>
+        </p:spPr>
+      </p:pic>
     </p:spTree>
   </p:cSld>
   <p:clrMapOvr>
     <a:masterClrMapping/>
   </p:clrMapOvr>
+  <p:timing>
+    <p:tnLst>
+      <p:par>
+        <p:cTn id="1" dur="indefinite" restart="never" nodeType="tmRoot">
+          <p:childTnLst>
+            <p:seq concurrent="1" nextAc="seek">
+              <p:cTn id="2" dur="indefinite" nodeType="mainSeq">
+                <p:childTnLst>
+                  <p:par>
+                    <p:cTn id="3" fill="hold">
+                      <p:stCondLst>
+                        <p:cond delay="indefinite"/>
+                        <p:cond evt="onBegin" delay="0">
+                          <p:tn val="2"/>
+                        </p:cond>
+                      </p:stCondLst>
+                      <p:childTnLst>
+                        <p:par>
+                          <p:cTn id="4" fill="hold">
+                            <p:stCondLst>
+                              <p:cond delay="0"/>
+                            </p:stCondLst>
+                            <p:childTnLst>
+                              <p:par>
+                                <p:cTn id="5" presetID="1" presetClass="mediacall" presetSubtype="0" fill="hold" nodeType="afterEffect">
+                                  <p:stCondLst>
+                                    <p:cond delay="0"/>
+                                  </p:stCondLst>
+                                  <p:childTnLst>
+                                    <p:cmd type="call" cmd="playFrom(0.0)">
+                                      <p:cBhvr>
+                                        <p:cTn id="6" dur="1" fill="hold"/>
+                                        <p:tgtEl>
+                                          <p:spTgt spid="9"/>
+                                        </p:tgtEl>
+                                      </p:cBhvr>
+                                    </p:cmd>
+                                  </p:childTnLst>
+                                </p:cTn>
+                              </p:par>
+                            </p:childTnLst>
+                          </p:cTn>
+                        </p:par>
+                        <p:par>
+                          <p:cTn id="7" fill="hold">
+                            <p:stCondLst>
+                              <p:cond delay="0"/>
+                            </p:stCondLst>
+                            <p:childTnLst>
+                              <p:par>
+                                <p:cTn id="8" presetID="1" presetClass="mediacall" presetSubtype="0" fill="hold" nodeType="afterEffect">
+                                  <p:stCondLst>
+                                    <p:cond delay="0"/>
+                                  </p:stCondLst>
+                                  <p:childTnLst>
+                                    <p:cmd type="call" cmd="playFrom(0.0)">
+                                      <p:cBhvr>
+                                        <p:cTn id="9" dur="1" fill="hold"/>
+                                        <p:tgtEl>
+                                          <p:spTgt spid="12"/>
+                                        </p:tgtEl>
+                                      </p:cBhvr>
+                                    </p:cmd>
+                                  </p:childTnLst>
+                                </p:cTn>
+                              </p:par>
+                            </p:childTnLst>
+                          </p:cTn>
+                        </p:par>
+                      </p:childTnLst>
+                    </p:cTn>
+                  </p:par>
+                </p:childTnLst>
+              </p:cTn>
+              <p:prevCondLst>
+                <p:cond evt="onPrev" delay="0">
+                  <p:tgtEl>
+                    <p:sldTgt/>
+                  </p:tgtEl>
+                </p:cond>
+              </p:prevCondLst>
+              <p:nextCondLst>
+                <p:cond evt="onNext" delay="0">
+                  <p:tgtEl>
+                    <p:sldTgt/>
+                  </p:tgtEl>
+                </p:cond>
+              </p:nextCondLst>
+            </p:seq>
+            <p:video>
+              <p:cMediaNode>
+                <p:cTn id="10" fill="hold" display="0">
+                  <p:stCondLst>
+                    <p:cond delay="indefinite"/>
+                  </p:stCondLst>
+                  <p:endCondLst>
+                    <p:cond evt="onNext" delay="0">
+                      <p:tgtEl>
+                        <p:sldTgt/>
+                      </p:tgtEl>
+                    </p:cond>
+                    <p:cond evt="onPrev" delay="0">
+                      <p:tgtEl>
+                        <p:sldTgt/>
+                      </p:tgtEl>
+                    </p:cond>
+                  </p:endCondLst>
+                </p:cTn>
+                <p:tgtEl>
+                  <p:spTgt spid="9"/>
+                </p:tgtEl>
+              </p:cMediaNode>
+            </p:video>
+            <p:seq concurrent="1" nextAc="seek">
+              <p:cTn id="11" restart="whenNotActive" fill="hold" evtFilter="cancelBubble" nodeType="interactiveSeq">
+                <p:stCondLst>
+                  <p:cond evt="onClick" delay="0">
+                    <p:tgtEl>
+                      <p:spTgt spid="9"/>
+                    </p:tgtEl>
+                  </p:cond>
+                </p:stCondLst>
+                <p:endSync evt="end" delay="0">
+                  <p:rtn val="all"/>
+                </p:endSync>
+                <p:childTnLst>
+                  <p:par>
+                    <p:cTn id="12" fill="hold">
+                      <p:stCondLst>
+                        <p:cond delay="0"/>
+                      </p:stCondLst>
+                      <p:childTnLst>
+                        <p:par>
+                          <p:cTn id="13" fill="hold">
+                            <p:stCondLst>
+                              <p:cond delay="0"/>
+                            </p:stCondLst>
+                            <p:childTnLst>
+                              <p:par>
+                                <p:cTn id="14" presetID="2" presetClass="mediacall" presetSubtype="0" fill="hold" nodeType="clickEffect">
+                                  <p:stCondLst>
+                                    <p:cond delay="0"/>
+                                  </p:stCondLst>
+                                  <p:childTnLst>
+                                    <p:cmd type="call" cmd="togglePause">
+                                      <p:cBhvr>
+                                        <p:cTn id="15" dur="1" fill="hold"/>
+                                        <p:tgtEl>
+                                          <p:spTgt spid="9"/>
+                                        </p:tgtEl>
+                                      </p:cBhvr>
+                                    </p:cmd>
+                                  </p:childTnLst>
+                                </p:cTn>
+                              </p:par>
+                            </p:childTnLst>
+                          </p:cTn>
+                        </p:par>
+                      </p:childTnLst>
+                    </p:cTn>
+                  </p:par>
+                </p:childTnLst>
+              </p:cTn>
+              <p:nextCondLst>
+                <p:cond evt="onClick" delay="0">
+                  <p:tgtEl>
+                    <p:spTgt spid="9"/>
+                  </p:tgtEl>
+                </p:cond>
+              </p:nextCondLst>
+            </p:seq>
+            <p:video>
+              <p:cMediaNode>
+                <p:cTn id="16" fill="hold" display="0">
+                  <p:stCondLst>
+                    <p:cond delay="indefinite"/>
+                  </p:stCondLst>
+                  <p:endCondLst>
+                    <p:cond evt="onNext" delay="0">
+                      <p:tgtEl>
+                        <p:sldTgt/>
+                      </p:tgtEl>
+                    </p:cond>
+                    <p:cond evt="onPrev" delay="0">
+                      <p:tgtEl>
+                        <p:sldTgt/>
+                      </p:tgtEl>
+                    </p:cond>
+                  </p:endCondLst>
+                </p:cTn>
+                <p:tgtEl>
+                  <p:spTgt spid="12"/>
+                </p:tgtEl>
+              </p:cMediaNode>
+            </p:video>
+            <p:seq concurrent="1" nextAc="seek">
+              <p:cTn id="17" restart="whenNotActive" fill="hold" evtFilter="cancelBubble" nodeType="interactiveSeq">
+                <p:stCondLst>
+                  <p:cond evt="onClick" delay="0">
+                    <p:tgtEl>
+                      <p:spTgt spid="12"/>
+                    </p:tgtEl>
+                  </p:cond>
+                </p:stCondLst>
+                <p:endSync evt="end" delay="0">
+                  <p:rtn val="all"/>
+                </p:endSync>
+                <p:childTnLst>
+                  <p:par>
+                    <p:cTn id="18" fill="hold">
+                      <p:stCondLst>
+                        <p:cond delay="0"/>
+                      </p:stCondLst>
+                      <p:childTnLst>
+                        <p:par>
+                          <p:cTn id="19" fill="hold">
+                            <p:stCondLst>
+                              <p:cond delay="0"/>
+                            </p:stCondLst>
+                            <p:childTnLst>
+                              <p:par>
+                                <p:cTn id="20" presetID="2" presetClass="mediacall" presetSubtype="0" fill="hold" nodeType="clickEffect">
+                                  <p:stCondLst>
+                                    <p:cond delay="0"/>
+                                  </p:stCondLst>
+                                  <p:childTnLst>
+                                    <p:cmd type="call" cmd="togglePause">
+                                      <p:cBhvr>
+                                        <p:cTn id="21" dur="1" fill="hold"/>
+                                        <p:tgtEl>
+                                          <p:spTgt spid="12"/>
+                                        </p:tgtEl>
+                                      </p:cBhvr>
+                                    </p:cmd>
+                                  </p:childTnLst>
+                                </p:cTn>
+                              </p:par>
+                            </p:childTnLst>
+                          </p:cTn>
+                        </p:par>
+                      </p:childTnLst>
+                    </p:cTn>
+                  </p:par>
+                </p:childTnLst>
+              </p:cTn>
+              <p:nextCondLst>
+                <p:cond evt="onClick" delay="0">
+                  <p:tgtEl>
+                    <p:spTgt spid="12"/>
+                  </p:tgtEl>
+                </p:cond>
+              </p:nextCondLst>
+            </p:seq>
+          </p:childTnLst>
+        </p:cTn>
+      </p:par>
+    </p:tnLst>
+  </p:timing>
 </p:sld>
 </file>
 
@@ -7934,7 +8622,7 @@
             <a:pPr algn="r"/>
             <a:r>
               <a:rPr lang="he-IL" sz="6000" dirty="0" smtClean="0"/>
-              <a:t>הצגה עצמית</a:t>
+              <a:t>הרעיון</a:t>
             </a:r>
             <a:endParaRPr lang="he-IL" sz="6000" dirty="0"/>
           </a:p>
@@ -7952,24 +8640,124 @@
         </p:nvSpPr>
         <p:spPr/>
         <p:txBody>
-          <a:bodyPr>
-            <a:normAutofit/>
-          </a:bodyPr>
-          <a:lstStyle/>
-          <a:p>
-            <a:r>
-              <a:rPr lang="he-IL" sz="8000" dirty="0" smtClean="0"/>
-              <a:t>להוסיף סרטון כאן</a:t>
-            </a:r>
-            <a:endParaRPr lang="he-IL" sz="8000" dirty="0"/>
-          </a:p>
-        </p:txBody>
-      </p:sp>
+          <a:bodyPr/>
+          <a:lstStyle/>
+          <a:p>
+            <a:r>
+              <a:rPr lang="he-IL" dirty="0" smtClean="0"/>
+              <a:t>מחרוזת ההתייחסות (</a:t>
+            </a:r>
+            <a:r>
+              <a:rPr lang="en-US" dirty="0" smtClean="0"/>
+              <a:t>reference</a:t>
+            </a:r>
+            <a:r>
+              <a:rPr lang="he-IL" dirty="0" smtClean="0"/>
+              <a:t>) שהיא דנ"א ידוע</a:t>
+            </a:r>
+          </a:p>
+          <a:p>
+            <a:endParaRPr lang="he-IL" dirty="0" smtClean="0"/>
+          </a:p>
+          <a:p>
+            <a:endParaRPr lang="he-IL" dirty="0" smtClean="0"/>
+          </a:p>
+          <a:p>
+            <a:r>
+              <a:rPr lang="he-IL" dirty="0" smtClean="0"/>
+              <a:t>מחרוזת הדגימה (</a:t>
+            </a:r>
+            <a:r>
+              <a:rPr lang="en-US" dirty="0" smtClean="0"/>
+              <a:t>sample, read</a:t>
+            </a:r>
+            <a:r>
+              <a:rPr lang="he-IL" dirty="0" smtClean="0"/>
+              <a:t>) שהיא חתיכה מדנ"א אותה  רוצים למפות</a:t>
+            </a:r>
+          </a:p>
+          <a:p>
+            <a:endParaRPr lang="he-IL" dirty="0"/>
+          </a:p>
+        </p:txBody>
+      </p:sp>
+      <p:pic>
+        <p:nvPicPr>
+          <p:cNvPr id="1028" name="Picture 4"/>
+          <p:cNvPicPr>
+            <a:picLocks noChangeAspect="1" noChangeArrowheads="1"/>
+          </p:cNvPicPr>
+          <p:nvPr/>
+        </p:nvPicPr>
+        <p:blipFill>
+          <a:blip r:embed="rId3" cstate="print"/>
+          <a:srcRect/>
+          <a:stretch>
+            <a:fillRect/>
+          </a:stretch>
+        </p:blipFill>
+        <p:spPr bwMode="auto">
+          <a:xfrm>
+            <a:off x="323528" y="2132856"/>
+            <a:ext cx="6727121" cy="613023"/>
+          </a:xfrm>
+          <a:prstGeom prst="rect">
+            <a:avLst/>
+          </a:prstGeom>
+          <a:noFill/>
+          <a:ln w="9525">
+            <a:noFill/>
+            <a:miter lim="800000"/>
+            <a:headEnd/>
+            <a:tailEnd/>
+          </a:ln>
+        </p:spPr>
+      </p:pic>
+      <p:pic>
+        <p:nvPicPr>
+          <p:cNvPr id="1030" name="Picture 6"/>
+          <p:cNvPicPr>
+            <a:picLocks noChangeAspect="1" noChangeArrowheads="1"/>
+          </p:cNvPicPr>
+          <p:nvPr/>
+        </p:nvPicPr>
+        <p:blipFill>
+          <a:blip r:embed="rId4" cstate="print"/>
+          <a:srcRect/>
+          <a:stretch>
+            <a:fillRect/>
+          </a:stretch>
+        </p:blipFill>
+        <p:spPr bwMode="auto">
+          <a:xfrm>
+            <a:off x="467544" y="3356992"/>
+            <a:ext cx="2211294" cy="576064"/>
+          </a:xfrm>
+          <a:prstGeom prst="rect">
+            <a:avLst/>
+          </a:prstGeom>
+          <a:noFill/>
+          <a:ln w="9525">
+            <a:noFill/>
+            <a:miter lim="800000"/>
+            <a:headEnd/>
+            <a:tailEnd/>
+          </a:ln>
+        </p:spPr>
+      </p:pic>
     </p:spTree>
   </p:cSld>
   <p:clrMapOvr>
     <a:masterClrMapping/>
   </p:clrMapOvr>
+  <p:transition/>
+  <p:timing>
+    <p:tnLst>
+      <p:par>
+        <p:cTn id="1" dur="indefinite" restart="never" nodeType="tmRoot"/>
+      </p:par>
+    </p:tnLst>
+  </p:timing>
 </p:sld>
 </file>
 
@@ -8041,7 +8829,7 @@
             </a:r>
             <a:r>
               <a:rPr lang="he-IL" dirty="0" smtClean="0"/>
-              <a:t>)</a:t>
+              <a:t>) שהיא דנ"א ידוע</a:t>
             </a:r>
           </a:p>
           <a:p>
@@ -8061,9 +8849,8 @@
             </a:r>
             <a:r>
               <a:rPr lang="he-IL" dirty="0" smtClean="0"/>
-              <a:t>)</a:t>
-            </a:r>
-            <a:endParaRPr lang="he-IL" dirty="0" smtClean="0"/>
+              <a:t>) שהיא חתיכה מדנ"א אותה  רוצים למפות</a:t>
+            </a:r>
           </a:p>
           <a:p>
             <a:endParaRPr lang="he-IL" dirty="0"/>
@@ -8093,13 +8880,20 @@
           <a:prstGeom prst="rect">
             <a:avLst/>
           </a:prstGeom>
-          <a:noFill/>
-          <a:ln w="9525">
-            <a:noFill/>
+          <a:ln w="38100" cap="sq">
+            <a:solidFill>
+              <a:srgbClr val="000000"/>
+            </a:solidFill>
+            <a:prstDash val="solid"/>
             <a:miter lim="800000"/>
-            <a:headEnd/>
-            <a:tailEnd/>
           </a:ln>
+          <a:effectLst>
+            <a:outerShdw blurRad="50800" dist="38100" dir="2700000" algn="tl" rotWithShape="0">
+              <a:srgbClr val="000000">
+                <a:alpha val="43000"/>
+              </a:srgbClr>
+            </a:outerShdw>
+          </a:effectLst>
         </p:spPr>
       </p:pic>
       <p:pic>
@@ -8139,6 +8933,14 @@
   <p:clrMapOvr>
     <a:masterClrMapping/>
   </p:clrMapOvr>
+  <p:transition/>
+  <p:timing>
+    <p:tnLst>
+      <p:par>
+        <p:cTn id="1" dur="indefinite" restart="never" nodeType="tmRoot"/>
+      </p:par>
+    </p:tnLst>
+  </p:timing>
 </p:sld>
 </file>
 
@@ -8210,7 +9012,7 @@
             </a:r>
             <a:r>
               <a:rPr lang="he-IL" dirty="0" smtClean="0"/>
-              <a:t>)</a:t>
+              <a:t>) שהיא דנ"א ידוע</a:t>
             </a:r>
           </a:p>
           <a:p>
@@ -8226,17 +9028,12 @@
             </a:r>
             <a:r>
               <a:rPr lang="en-US" dirty="0" smtClean="0"/>
-              <a:t>sample, </a:t>
-            </a:r>
-            <a:r>
-              <a:rPr lang="en-US" dirty="0" smtClean="0"/>
-              <a:t>read</a:t>
+              <a:t>sample, read</a:t>
             </a:r>
             <a:r>
               <a:rPr lang="he-IL" dirty="0" smtClean="0"/>
-              <a:t>)</a:t>
-            </a:r>
-            <a:endParaRPr lang="he-IL" dirty="0" smtClean="0"/>
+              <a:t>) שהיא חתיכה מדנ"א אותה  רוצים למצוא</a:t>
+            </a:r>
           </a:p>
           <a:p>
             <a:endParaRPr lang="he-IL" dirty="0"/>
@@ -8266,20 +9063,13 @@
           <a:prstGeom prst="rect">
             <a:avLst/>
           </a:prstGeom>
-          <a:ln w="38100" cap="sq">
-            <a:solidFill>
-              <a:srgbClr val="000000"/>
-            </a:solidFill>
-            <a:prstDash val="solid"/>
+          <a:noFill/>
+          <a:ln w="9525">
+            <a:noFill/>
             <a:miter lim="800000"/>
+            <a:headEnd/>
+            <a:tailEnd/>
           </a:ln>
-          <a:effectLst>
-            <a:outerShdw blurRad="50800" dist="38100" dir="2700000" algn="tl" rotWithShape="0">
-              <a:srgbClr val="000000">
-                <a:alpha val="43000"/>
-              </a:srgbClr>
-            </a:outerShdw>
-          </a:effectLst>
         </p:spPr>
       </p:pic>
       <p:pic>
@@ -8305,13 +9095,20 @@
           <a:prstGeom prst="rect">
             <a:avLst/>
           </a:prstGeom>
-          <a:noFill/>
-          <a:ln w="9525">
-            <a:noFill/>
+          <a:ln w="38100" cap="sq">
+            <a:solidFill>
+              <a:srgbClr val="000000"/>
+            </a:solidFill>
+            <a:prstDash val="solid"/>
             <a:miter lim="800000"/>
-            <a:headEnd/>
-            <a:tailEnd/>
           </a:ln>
+          <a:effectLst>
+            <a:outerShdw blurRad="50800" dist="38100" dir="2700000" algn="tl" rotWithShape="0">
+              <a:srgbClr val="000000">
+                <a:alpha val="43000"/>
+              </a:srgbClr>
+            </a:outerShdw>
+          </a:effectLst>
         </p:spPr>
       </p:pic>
     </p:spTree>
@@ -8319,6 +9116,14 @@
   <p:clrMapOvr>
     <a:masterClrMapping/>
   </p:clrMapOvr>
+  <p:transition/>
+  <p:timing>
+    <p:tnLst>
+      <p:par>
+        <p:cTn id="1" dur="indefinite" restart="never" nodeType="tmRoot"/>
+      </p:par>
+    </p:tnLst>
+  </p:timing>
 </p:sld>
 </file>
 
@@ -8352,16 +9157,16 @@
         <p:spPr/>
         <p:txBody>
           <a:bodyPr>
-            <a:normAutofit/>
+            <a:noAutofit/>
           </a:bodyPr>
           <a:lstStyle/>
           <a:p>
-            <a:pPr algn="r"/>
-            <a:r>
-              <a:rPr lang="he-IL" sz="6000" dirty="0" smtClean="0"/>
-              <a:t>הרעיון</a:t>
-            </a:r>
-            <a:endParaRPr lang="he-IL" sz="6000" dirty="0"/>
+            <a:pPr algn="l" rtl="0"/>
+            <a:r>
+              <a:rPr lang="en-US" sz="4400" dirty="0" smtClean="0"/>
+              <a:t>Burrows-Wheeler Aligner</a:t>
+            </a:r>
+            <a:endParaRPr lang="he-IL" sz="4400" dirty="0"/>
           </a:p>
         </p:txBody>
       </p:sp>
@@ -8380,125 +9185,44 @@
           <a:bodyPr/>
           <a:lstStyle/>
           <a:p>
+            <a:endParaRPr lang="en-US" dirty="0" smtClean="0"/>
+          </a:p>
+          <a:p>
+            <a:endParaRPr lang="he-IL" dirty="0" smtClean="0"/>
+          </a:p>
+          <a:p>
             <a:r>
               <a:rPr lang="he-IL" dirty="0" smtClean="0"/>
-              <a:t>מחרוזת ההתייחסות (</a:t>
-            </a:r>
-            <a:r>
-              <a:rPr lang="en-US" dirty="0" smtClean="0"/>
-              <a:t>reference</a:t>
-            </a:r>
+              <a:t>אלגוריתם למציאת כלל ההתאמות של מחרוזת אחת בתוך מחרוזת שנייה.</a:t>
+            </a:r>
+          </a:p>
+          <a:p>
+            <a:endParaRPr lang="he-IL" dirty="0" smtClean="0"/>
+          </a:p>
+          <a:p>
             <a:r>
               <a:rPr lang="he-IL" dirty="0" smtClean="0"/>
-              <a:t>)</a:t>
+              <a:t>ניתן גם לחפש התאמות לא מדויקות כלומר התאמות עם חסם על מספר הטעויות.</a:t>
             </a:r>
           </a:p>
           <a:p>
             <a:endParaRPr lang="he-IL" dirty="0" smtClean="0"/>
           </a:p>
-          <a:p>
-            <a:endParaRPr lang="he-IL" dirty="0" smtClean="0"/>
-          </a:p>
-          <a:p>
-            <a:r>
-              <a:rPr lang="he-IL" dirty="0" smtClean="0"/>
-              <a:t>מחרוזת הדגימה (</a:t>
-            </a:r>
-            <a:r>
-              <a:rPr lang="en-US" dirty="0" smtClean="0"/>
-              <a:t>sample, </a:t>
-            </a:r>
-            <a:r>
-              <a:rPr lang="en-US" dirty="0" smtClean="0"/>
-              <a:t>read</a:t>
-            </a:r>
-            <a:r>
-              <a:rPr lang="he-IL" dirty="0" smtClean="0"/>
-              <a:t>)</a:t>
-            </a:r>
-            <a:endParaRPr lang="he-IL" dirty="0" smtClean="0"/>
-          </a:p>
-          <a:p>
-            <a:endParaRPr lang="he-IL" dirty="0"/>
-          </a:p>
-        </p:txBody>
-      </p:sp>
-      <p:pic>
-        <p:nvPicPr>
-          <p:cNvPr id="1028" name="Picture 4"/>
-          <p:cNvPicPr>
-            <a:picLocks noChangeAspect="1" noChangeArrowheads="1"/>
-          </p:cNvPicPr>
-          <p:nvPr/>
-        </p:nvPicPr>
-        <p:blipFill>
-          <a:blip r:embed="rId3" cstate="print"/>
-          <a:srcRect/>
-          <a:stretch>
-            <a:fillRect/>
-          </a:stretch>
-        </p:blipFill>
-        <p:spPr bwMode="auto">
-          <a:xfrm>
-            <a:off x="323528" y="2132856"/>
-            <a:ext cx="6727121" cy="613023"/>
-          </a:xfrm>
-          <a:prstGeom prst="rect">
-            <a:avLst/>
-          </a:prstGeom>
-          <a:noFill/>
-          <a:ln w="9525">
-            <a:noFill/>
-            <a:miter lim="800000"/>
-            <a:headEnd/>
-            <a:tailEnd/>
-          </a:ln>
-        </p:spPr>
-      </p:pic>
-      <p:pic>
-        <p:nvPicPr>
-          <p:cNvPr id="1030" name="Picture 6"/>
-          <p:cNvPicPr>
-            <a:picLocks noChangeAspect="1" noChangeArrowheads="1"/>
-          </p:cNvPicPr>
-          <p:nvPr/>
-        </p:nvPicPr>
-        <p:blipFill>
-          <a:blip r:embed="rId4" cstate="print"/>
-          <a:srcRect/>
-          <a:stretch>
-            <a:fillRect/>
-          </a:stretch>
-        </p:blipFill>
-        <p:spPr bwMode="auto">
-          <a:xfrm>
-            <a:off x="467544" y="3356992"/>
-            <a:ext cx="2211294" cy="576064"/>
-          </a:xfrm>
-          <a:prstGeom prst="rect">
-            <a:avLst/>
-          </a:prstGeom>
-          <a:ln w="38100" cap="sq">
-            <a:solidFill>
-              <a:srgbClr val="000000"/>
-            </a:solidFill>
-            <a:prstDash val="solid"/>
-            <a:miter lim="800000"/>
-          </a:ln>
-          <a:effectLst>
-            <a:outerShdw blurRad="50800" dist="38100" dir="2700000" algn="tl" rotWithShape="0">
-              <a:srgbClr val="000000">
-                <a:alpha val="43000"/>
-              </a:srgbClr>
-            </a:outerShdw>
-          </a:effectLst>
-        </p:spPr>
-      </p:pic>
+        </p:txBody>
+      </p:sp>
     </p:spTree>
   </p:cSld>
   <p:clrMapOvr>
     <a:masterClrMapping/>
   </p:clrMapOvr>
+  <p:transition/>
+  <p:timing>
+    <p:tnLst>
+      <p:par>
+        <p:cTn id="1" dur="indefinite" restart="never" nodeType="tmRoot"/>
+      </p:par>
+    </p:tnLst>
+  </p:timing>
 </p:sld>
 </file>
 
@@ -8560,36 +9284,93 @@
           <a:bodyPr/>
           <a:lstStyle/>
           <a:p>
-            <a:endParaRPr lang="en-US" dirty="0" smtClean="0"/>
-          </a:p>
-          <a:p>
             <a:endParaRPr lang="he-IL" dirty="0" smtClean="0"/>
           </a:p>
           <a:p>
             <a:r>
               <a:rPr lang="he-IL" dirty="0" smtClean="0"/>
-              <a:t>אלגוריתם למציאת כלל ההתאמות של מחרוזת אחת בתוך מחרוזת שנייה.</a:t>
-            </a:r>
-          </a:p>
-          <a:p>
+              <a:t>עבור הדוגמה וחסם טעויות של 2 נקבל התאמות:</a:t>
+            </a:r>
+          </a:p>
+          <a:p>
+            <a:pPr lvl="1"/>
+            <a:r>
+              <a:rPr lang="he-IL" dirty="0" smtClean="0"/>
+              <a:t>היסט 0</a:t>
+            </a:r>
+          </a:p>
+          <a:p>
+            <a:pPr lvl="1"/>
+            <a:r>
+              <a:rPr lang="he-IL" dirty="0" smtClean="0"/>
+              <a:t>היסט 5</a:t>
+            </a:r>
+          </a:p>
+          <a:p>
+            <a:pPr lvl="1"/>
+            <a:r>
+              <a:rPr lang="he-IL" dirty="0" smtClean="0"/>
+              <a:t>היסט 10</a:t>
+            </a:r>
+          </a:p>
+          <a:p>
+            <a:pPr lvl="1"/>
             <a:endParaRPr lang="he-IL" dirty="0" smtClean="0"/>
           </a:p>
           <a:p>
-            <a:r>
-              <a:rPr lang="he-IL" dirty="0" smtClean="0"/>
-              <a:t>ניתן גם לחפש התאמות לא מדויקות כלומר התאמות עם חסם על מספר הטעויות.</a:t>
-            </a:r>
-          </a:p>
-          <a:p>
+            <a:pPr lvl="1"/>
             <a:endParaRPr lang="he-IL" dirty="0" smtClean="0"/>
           </a:p>
-        </p:txBody>
-      </p:sp>
+          <a:p>
+            <a:pPr lvl="1"/>
+            <a:endParaRPr lang="he-IL" dirty="0" smtClean="0"/>
+          </a:p>
+        </p:txBody>
+      </p:sp>
+      <p:pic>
+        <p:nvPicPr>
+          <p:cNvPr id="2052" name="Picture 4"/>
+          <p:cNvPicPr>
+            <a:picLocks noChangeAspect="1" noChangeArrowheads="1"/>
+          </p:cNvPicPr>
+          <p:nvPr/>
+        </p:nvPicPr>
+        <p:blipFill>
+          <a:blip r:embed="rId3" cstate="print"/>
+          <a:srcRect/>
+          <a:stretch>
+            <a:fillRect/>
+          </a:stretch>
+        </p:blipFill>
+        <p:spPr bwMode="auto">
+          <a:xfrm>
+            <a:off x="539552" y="3789040"/>
+            <a:ext cx="6406185" cy="1584176"/>
+          </a:xfrm>
+          <a:prstGeom prst="rect">
+            <a:avLst/>
+          </a:prstGeom>
+          <a:noFill/>
+          <a:ln w="9525">
+            <a:noFill/>
+            <a:miter lim="800000"/>
+            <a:headEnd/>
+            <a:tailEnd/>
+          </a:ln>
+        </p:spPr>
+      </p:pic>
     </p:spTree>
   </p:cSld>
   <p:clrMapOvr>
     <a:masterClrMapping/>
   </p:clrMapOvr>
+  <p:timing>
+    <p:tnLst>
+      <p:par>
+        <p:cTn id="1" dur="indefinite" restart="never" nodeType="tmRoot"/>
+      </p:par>
+    </p:tnLst>
+  </p:timing>
 </p:sld>
 </file>
 
@@ -8630,7 +9411,7 @@
             <a:pPr algn="l" rtl="0"/>
             <a:r>
               <a:rPr lang="en-US" sz="4400" dirty="0" smtClean="0"/>
-              <a:t>Burrows-Wheeler Aligner</a:t>
+              <a:t>Smith Waterman</a:t>
             </a:r>
             <a:endParaRPr lang="he-IL" sz="4400" dirty="0"/>
           </a:p>
@@ -8656,47 +9437,61 @@
           <a:p>
             <a:r>
               <a:rPr lang="he-IL" dirty="0" smtClean="0"/>
-              <a:t>עבור הדוגמה וחסם טעויות של 2 נקבל התאמות:</a:t>
+              <a:t>אלגוריתם המספק ציון לזהות בין שתי מחרוזות כלשהן.</a:t>
+            </a:r>
+          </a:p>
+          <a:p>
+            <a:endParaRPr lang="en-US" dirty="0" smtClean="0"/>
+          </a:p>
+          <a:p>
+            <a:endParaRPr lang="en-US" dirty="0" smtClean="0"/>
+          </a:p>
+          <a:p>
+            <a:endParaRPr lang="he-IL" dirty="0" smtClean="0"/>
+          </a:p>
+          <a:p>
+            <a:r>
+              <a:rPr lang="he-IL" dirty="0" smtClean="0"/>
+              <a:t>האלגוריתם מתחשב במקרים של:</a:t>
             </a:r>
           </a:p>
           <a:p>
             <a:pPr lvl="1"/>
             <a:r>
               <a:rPr lang="he-IL" dirty="0" smtClean="0"/>
-              <a:t>היסט 0</a:t>
+              <a:t>התאמה</a:t>
             </a:r>
           </a:p>
           <a:p>
             <a:pPr lvl="1"/>
             <a:r>
               <a:rPr lang="he-IL" dirty="0" smtClean="0"/>
-              <a:t>היסט 5</a:t>
+              <a:t>אי התאמה</a:t>
             </a:r>
           </a:p>
           <a:p>
             <a:pPr lvl="1"/>
             <a:r>
               <a:rPr lang="he-IL" dirty="0" smtClean="0"/>
-              <a:t>היסט 10</a:t>
+              <a:t>הוספה</a:t>
+            </a:r>
+          </a:p>
+          <a:p>
+            <a:pPr lvl="1"/>
+            <a:r>
+              <a:rPr lang="he-IL" dirty="0" smtClean="0"/>
+              <a:t>מחיקה</a:t>
             </a:r>
           </a:p>
           <a:p>
             <a:pPr lvl="1"/>
             <a:endParaRPr lang="he-IL" dirty="0" smtClean="0"/>
           </a:p>
-          <a:p>
-            <a:pPr lvl="1"/>
-            <a:endParaRPr lang="he-IL" dirty="0" smtClean="0"/>
-          </a:p>
-          <a:p>
-            <a:pPr lvl="1"/>
-            <a:endParaRPr lang="he-IL" dirty="0" smtClean="0"/>
-          </a:p>
         </p:txBody>
       </p:sp>
       <p:pic>
         <p:nvPicPr>
-          <p:cNvPr id="2052" name="Picture 4"/>
+          <p:cNvPr id="1026" name="Picture 2"/>
           <p:cNvPicPr>
             <a:picLocks noChangeAspect="1" noChangeArrowheads="1"/>
           </p:cNvPicPr>
@@ -8711,8 +9506,8 @@
         </p:blipFill>
         <p:spPr bwMode="auto">
           <a:xfrm>
-            <a:off x="539552" y="3789040"/>
-            <a:ext cx="6406185" cy="1584176"/>
+            <a:off x="539552" y="2564904"/>
+            <a:ext cx="5819775" cy="1104900"/>
           </a:xfrm>
           <a:prstGeom prst="rect">
             <a:avLst/>
@@ -8731,6 +9526,13 @@
   <p:clrMapOvr>
     <a:masterClrMapping/>
   </p:clrMapOvr>
+  <p:timing>
+    <p:tnLst>
+      <p:par>
+        <p:cTn id="1" dur="indefinite" restart="never" nodeType="tmRoot"/>
+      </p:par>
+    </p:tnLst>
+  </p:timing>
 </p:sld>
 </file>
 
@@ -8797,57 +9599,58 @@
           <a:p>
             <a:r>
               <a:rPr lang="he-IL" dirty="0" smtClean="0"/>
-              <a:t>אלגוריתם המספק ציון לזהות בין שתי מחרוזות כלשהן.</a:t>
+              <a:t>התאמה</a:t>
             </a:r>
           </a:p>
           <a:p>
             <a:endParaRPr lang="he-IL" dirty="0" smtClean="0"/>
           </a:p>
-          <a:p>
-            <a:r>
-              <a:rPr lang="he-IL" dirty="0" smtClean="0"/>
-              <a:t>האלגוריתם מתחשב במקרים של:</a:t>
-            </a:r>
-          </a:p>
-          <a:p>
-            <a:pPr lvl="1"/>
-            <a:r>
-              <a:rPr lang="he-IL" dirty="0" smtClean="0"/>
-              <a:t>התאמה</a:t>
-            </a:r>
-          </a:p>
-          <a:p>
-            <a:pPr lvl="1"/>
-            <a:r>
-              <a:rPr lang="he-IL" dirty="0" smtClean="0"/>
-              <a:t>אי התאמה</a:t>
-            </a:r>
-          </a:p>
-          <a:p>
-            <a:pPr lvl="1"/>
-            <a:r>
-              <a:rPr lang="he-IL" dirty="0" smtClean="0"/>
-              <a:t>הוספה</a:t>
-            </a:r>
-          </a:p>
-          <a:p>
-            <a:pPr lvl="1"/>
-            <a:r>
-              <a:rPr lang="he-IL" dirty="0" smtClean="0"/>
-              <a:t>מחיקה</a:t>
-            </a:r>
-          </a:p>
-          <a:p>
-            <a:pPr lvl="1"/>
-            <a:endParaRPr lang="he-IL" dirty="0" smtClean="0"/>
-          </a:p>
-        </p:txBody>
-      </p:sp>
+        </p:txBody>
+      </p:sp>
+      <p:pic>
+        <p:nvPicPr>
+          <p:cNvPr id="3075" name="Picture 3"/>
+          <p:cNvPicPr>
+            <a:picLocks noChangeAspect="1" noChangeArrowheads="1"/>
+          </p:cNvPicPr>
+          <p:nvPr/>
+        </p:nvPicPr>
+        <p:blipFill>
+          <a:blip r:embed="rId3" cstate="print"/>
+          <a:srcRect/>
+          <a:stretch>
+            <a:fillRect/>
+          </a:stretch>
+        </p:blipFill>
+        <p:spPr bwMode="auto">
+          <a:xfrm>
+            <a:off x="761177" y="3000374"/>
+            <a:ext cx="7258745" cy="1508746"/>
+          </a:xfrm>
+          <a:prstGeom prst="rect">
+            <a:avLst/>
+          </a:prstGeom>
+          <a:noFill/>
+          <a:ln w="9525">
+            <a:noFill/>
+            <a:miter lim="800000"/>
+            <a:headEnd/>
+            <a:tailEnd/>
+          </a:ln>
+        </p:spPr>
+      </p:pic>
     </p:spTree>
   </p:cSld>
   <p:clrMapOvr>
     <a:masterClrMapping/>
   </p:clrMapOvr>
+  <p:timing>
+    <p:tnLst>
+      <p:par>
+        <p:cTn id="1" dur="indefinite" restart="never" nodeType="tmRoot"/>
+      </p:par>
+    </p:tnLst>
+  </p:timing>
 </p:sld>
 </file>
 
@@ -8914,7 +9717,7 @@
           <a:p>
             <a:r>
               <a:rPr lang="he-IL" dirty="0" smtClean="0"/>
-              <a:t>התאמה</a:t>
+              <a:t>אי התאמה</a:t>
             </a:r>
           </a:p>
           <a:p>
@@ -8924,7 +9727,7 @@
       </p:sp>
       <p:pic>
         <p:nvPicPr>
-          <p:cNvPr id="3075" name="Picture 3"/>
+          <p:cNvPr id="5122" name="Picture 2"/>
           <p:cNvPicPr>
             <a:picLocks noChangeAspect="1" noChangeArrowheads="1"/>
           </p:cNvPicPr>
@@ -8939,8 +9742,8 @@
         </p:blipFill>
         <p:spPr bwMode="auto">
           <a:xfrm>
-            <a:off x="761177" y="3000374"/>
-            <a:ext cx="7258745" cy="1508746"/>
+            <a:off x="769978" y="3000374"/>
+            <a:ext cx="7241980" cy="1508746"/>
           </a:xfrm>
           <a:prstGeom prst="rect">
             <a:avLst/>
@@ -8959,6 +9762,13 @@
   <p:clrMapOvr>
     <a:masterClrMapping/>
   </p:clrMapOvr>
+  <p:timing>
+    <p:tnLst>
+      <p:par>
+        <p:cTn id="1" dur="indefinite" restart="never" nodeType="tmRoot"/>
+      </p:par>
+    </p:tnLst>
+  </p:timing>
 </p:sld>
 </file>
 

</xml_diff>